<commit_message>
Updated the class introduction presentation
</commit_message>
<xml_diff>
--- a/presentations/Lecture00_Class_Introduction.pptx
+++ b/presentations/Lecture00_Class_Introduction.pptx
@@ -5,13 +5,17 @@
     <p:sldMasterId id="2147483660" r:id="rId1"/>
   </p:sldMasterIdLst>
   <p:notesMasterIdLst>
-    <p:notesMasterId r:id="rId6"/>
+    <p:notesMasterId r:id="rId10"/>
   </p:notesMasterIdLst>
   <p:sldIdLst>
     <p:sldId id="256" r:id="rId2"/>
     <p:sldId id="257" r:id="rId3"/>
-    <p:sldId id="258" r:id="rId4"/>
-    <p:sldId id="284" r:id="rId5"/>
+    <p:sldId id="284" r:id="rId4"/>
+    <p:sldId id="285" r:id="rId5"/>
+    <p:sldId id="286" r:id="rId6"/>
+    <p:sldId id="287" r:id="rId7"/>
+    <p:sldId id="288" r:id="rId8"/>
+    <p:sldId id="289" r:id="rId9"/>
   </p:sldIdLst>
   <p:sldSz cx="9144000" cy="6858000" type="letter"/>
   <p:notesSz cx="6858000" cy="9144000"/>
@@ -200,7 +204,7 @@
           <a:p>
             <a:fld id="{DC4283C3-12D5-DE4B-9445-FDB57A357B0B}" type="datetimeFigureOut">
               <a:rPr lang="en-US" smtClean="0"/>
-              <a:t>8/13/18</a:t>
+              <a:t>8/19/18</a:t>
             </a:fld>
             <a:endParaRPr lang="en-US"/>
           </a:p>
@@ -598,7 +602,7 @@
           <a:p>
             <a:fld id="{6B869A53-605A-B54A-BFF5-24A33751F9BE}" type="datetimeFigureOut">
               <a:rPr lang="en-US" smtClean="0"/>
-              <a:t>8/13/18</a:t>
+              <a:t>8/19/18</a:t>
             </a:fld>
             <a:endParaRPr lang="en-US"/>
           </a:p>
@@ -768,7 +772,7 @@
           <a:p>
             <a:fld id="{6B869A53-605A-B54A-BFF5-24A33751F9BE}" type="datetimeFigureOut">
               <a:rPr lang="en-US" smtClean="0"/>
-              <a:t>8/13/18</a:t>
+              <a:t>8/19/18</a:t>
             </a:fld>
             <a:endParaRPr lang="en-US"/>
           </a:p>
@@ -948,7 +952,7 @@
           <a:p>
             <a:fld id="{6B869A53-605A-B54A-BFF5-24A33751F9BE}" type="datetimeFigureOut">
               <a:rPr lang="en-US" smtClean="0"/>
-              <a:t>8/13/18</a:t>
+              <a:t>8/19/18</a:t>
             </a:fld>
             <a:endParaRPr lang="en-US"/>
           </a:p>
@@ -1118,7 +1122,7 @@
           <a:p>
             <a:fld id="{6B869A53-605A-B54A-BFF5-24A33751F9BE}" type="datetimeFigureOut">
               <a:rPr lang="en-US" smtClean="0"/>
-              <a:t>8/13/18</a:t>
+              <a:t>8/19/18</a:t>
             </a:fld>
             <a:endParaRPr lang="en-US"/>
           </a:p>
@@ -1362,7 +1366,7 @@
           <a:p>
             <a:fld id="{6B869A53-605A-B54A-BFF5-24A33751F9BE}" type="datetimeFigureOut">
               <a:rPr lang="en-US" smtClean="0"/>
-              <a:t>8/13/18</a:t>
+              <a:t>8/19/18</a:t>
             </a:fld>
             <a:endParaRPr lang="en-US"/>
           </a:p>
@@ -1594,7 +1598,7 @@
           <a:p>
             <a:fld id="{6B869A53-605A-B54A-BFF5-24A33751F9BE}" type="datetimeFigureOut">
               <a:rPr lang="en-US" smtClean="0"/>
-              <a:t>8/13/18</a:t>
+              <a:t>8/19/18</a:t>
             </a:fld>
             <a:endParaRPr lang="en-US"/>
           </a:p>
@@ -1961,7 +1965,7 @@
           <a:p>
             <a:fld id="{6B869A53-605A-B54A-BFF5-24A33751F9BE}" type="datetimeFigureOut">
               <a:rPr lang="en-US" smtClean="0"/>
-              <a:t>8/13/18</a:t>
+              <a:t>8/19/18</a:t>
             </a:fld>
             <a:endParaRPr lang="en-US"/>
           </a:p>
@@ -2079,7 +2083,7 @@
           <a:p>
             <a:fld id="{6B869A53-605A-B54A-BFF5-24A33751F9BE}" type="datetimeFigureOut">
               <a:rPr lang="en-US" smtClean="0"/>
-              <a:t>8/13/18</a:t>
+              <a:t>8/19/18</a:t>
             </a:fld>
             <a:endParaRPr lang="en-US"/>
           </a:p>
@@ -2174,7 +2178,7 @@
           <a:p>
             <a:fld id="{6B869A53-605A-B54A-BFF5-24A33751F9BE}" type="datetimeFigureOut">
               <a:rPr lang="en-US" smtClean="0"/>
-              <a:t>8/13/18</a:t>
+              <a:t>8/19/18</a:t>
             </a:fld>
             <a:endParaRPr lang="en-US"/>
           </a:p>
@@ -2451,7 +2455,7 @@
           <a:p>
             <a:fld id="{6B869A53-605A-B54A-BFF5-24A33751F9BE}" type="datetimeFigureOut">
               <a:rPr lang="en-US" smtClean="0"/>
-              <a:t>8/13/18</a:t>
+              <a:t>8/19/18</a:t>
             </a:fld>
             <a:endParaRPr lang="en-US"/>
           </a:p>
@@ -2708,7 +2712,7 @@
           <a:p>
             <a:fld id="{6B869A53-605A-B54A-BFF5-24A33751F9BE}" type="datetimeFigureOut">
               <a:rPr lang="en-US" smtClean="0"/>
-              <a:t>8/13/18</a:t>
+              <a:t>8/19/18</a:t>
             </a:fld>
             <a:endParaRPr lang="en-US"/>
           </a:p>
@@ -2921,7 +2925,7 @@
           <a:p>
             <a:fld id="{6B869A53-605A-B54A-BFF5-24A33751F9BE}" type="datetimeFigureOut">
               <a:rPr lang="en-US" smtClean="0"/>
-              <a:t>8/13/18</a:t>
+              <a:t>8/19/18</a:t>
             </a:fld>
             <a:endParaRPr lang="en-US"/>
           </a:p>
@@ -3401,6 +3405,35 @@
           </a:p>
         </p:txBody>
       </p:sp>
+      <p:pic>
+        <p:nvPicPr>
+          <p:cNvPr id="5" name="Picture 4">
+            <a:extLst>
+              <a:ext uri="{FF2B5EF4-FFF2-40B4-BE49-F238E27FC236}">
+                <a16:creationId xmlns:a16="http://schemas.microsoft.com/office/drawing/2014/main" id="{3E1ABB4E-4B52-8044-B98A-D15E74D5C3AC}"/>
+              </a:ext>
+            </a:extLst>
+          </p:cNvPr>
+          <p:cNvPicPr>
+            <a:picLocks noChangeAspect="1"/>
+          </p:cNvPicPr>
+          <p:nvPr/>
+        </p:nvPicPr>
+        <p:blipFill rotWithShape="1">
+          <a:blip r:embed="rId2"/>
+          <a:srcRect t="44848" b="34747"/>
+          <a:stretch/>
+        </p:blipFill>
+        <p:spPr>
+          <a:xfrm>
+            <a:off x="0" y="0"/>
+            <a:ext cx="9144000" cy="1399310"/>
+          </a:xfrm>
+          <a:prstGeom prst="rect">
+            <a:avLst/>
+          </a:prstGeom>
+        </p:spPr>
+      </p:pic>
     </p:spTree>
     <p:extLst>
       <p:ext uri="{BB962C8B-B14F-4D97-AF65-F5344CB8AC3E}">
@@ -3454,7 +3487,7 @@
           <a:p>
             <a:r>
               <a:rPr lang="en-US" dirty="0"/>
-              <a:t>Class Format</a:t>
+              <a:t>Class Information</a:t>
             </a:r>
           </a:p>
         </p:txBody>
@@ -3477,18 +3510,46 @@
         </p:nvSpPr>
         <p:spPr/>
         <p:txBody>
-          <a:bodyPr/>
-          <a:lstStyle/>
+          <a:bodyPr>
+            <a:normAutofit fontScale="92500" lnSpcReduction="20000"/>
+          </a:bodyPr>
+          <a:lstStyle/>
+          <a:p>
+            <a:r>
+              <a:rPr lang="en-US" dirty="0"/>
+              <a:t>Instructors</a:t>
+            </a:r>
+          </a:p>
+          <a:p>
+            <a:pPr lvl="1"/>
+            <a:r>
+              <a:rPr lang="en-US" dirty="0"/>
+              <a:t>Chris Langevin</a:t>
+            </a:r>
+          </a:p>
+          <a:p>
+            <a:pPr lvl="1"/>
+            <a:r>
+              <a:rPr lang="en-US" dirty="0"/>
+              <a:t>Joe Hughes</a:t>
+            </a:r>
+          </a:p>
+          <a:p>
+            <a:pPr lvl="1"/>
+            <a:r>
+              <a:rPr lang="en-US" dirty="0"/>
+              <a:t>Scott </a:t>
+            </a:r>
+            <a:r>
+              <a:rPr lang="en-US" dirty="0" err="1"/>
+              <a:t>Paulinski</a:t>
+            </a:r>
+            <a:endParaRPr lang="en-US" dirty="0"/>
+          </a:p>
           <a:p>
             <a:r>
               <a:rPr lang="en-US" dirty="0"/>
               <a:t>Lectures</a:t>
-            </a:r>
-          </a:p>
-          <a:p>
-            <a:r>
-              <a:rPr lang="en-US" dirty="0"/>
-              <a:t>Case studies</a:t>
             </a:r>
           </a:p>
           <a:p>
@@ -3518,6 +3579,24 @@
               <a:t>ModelViewer</a:t>
             </a:r>
             <a:endParaRPr lang="en-US" dirty="0"/>
+          </a:p>
+          <a:p>
+            <a:r>
+              <a:rPr lang="en-US" dirty="0"/>
+              <a:t>Discussions</a:t>
+            </a:r>
+          </a:p>
+          <a:p>
+            <a:r>
+              <a:rPr lang="en-US" dirty="0"/>
+              <a:t>Case studies</a:t>
+            </a:r>
+          </a:p>
+          <a:p>
+            <a:r>
+              <a:rPr lang="en-US" dirty="0"/>
+              <a:t>Special Topics</a:t>
+            </a:r>
           </a:p>
         </p:txBody>
       </p:sp>
@@ -3556,7 +3635,7 @@
           <p:cNvPr id="2" name="Title 1">
             <a:extLst>
               <a:ext uri="{FF2B5EF4-FFF2-40B4-BE49-F238E27FC236}">
-                <a16:creationId xmlns:a16="http://schemas.microsoft.com/office/drawing/2014/main" id="{CF997CF1-C4B9-BA44-A7BC-0400695CED78}"/>
+                <a16:creationId xmlns:a16="http://schemas.microsoft.com/office/drawing/2014/main" id="{90AF501E-4EA6-9742-9956-D5E6787D122D}"/>
               </a:ext>
             </a:extLst>
           </p:cNvPr>
@@ -3574,7 +3653,7 @@
           <a:p>
             <a:r>
               <a:rPr lang="en-US" dirty="0"/>
-              <a:t>Instructors</a:t>
+              <a:t>Agenda Day 1</a:t>
             </a:r>
           </a:p>
         </p:txBody>
@@ -3584,7 +3663,7 @@
           <p:cNvPr id="3" name="Content Placeholder 2">
             <a:extLst>
               <a:ext uri="{FF2B5EF4-FFF2-40B4-BE49-F238E27FC236}">
-                <a16:creationId xmlns:a16="http://schemas.microsoft.com/office/drawing/2014/main" id="{BD537C0A-71B8-8247-B76E-49A73F7FE01D}"/>
+                <a16:creationId xmlns:a16="http://schemas.microsoft.com/office/drawing/2014/main" id="{4E09AFD4-CFF0-CC4A-B62C-130F234254E1}"/>
               </a:ext>
             </a:extLst>
           </p:cNvPr>
@@ -3597,25 +3676,59 @@
         </p:nvSpPr>
         <p:spPr/>
         <p:txBody>
-          <a:bodyPr/>
-          <a:lstStyle/>
-          <a:p>
-            <a:r>
-              <a:rPr lang="en-US" dirty="0"/>
-              <a:t>Langevin</a:t>
-            </a:r>
-          </a:p>
-          <a:p>
-            <a:r>
-              <a:rPr lang="en-US" dirty="0"/>
-              <a:t>Hughes</a:t>
-            </a:r>
-          </a:p>
-          <a:p>
-            <a:r>
-              <a:rPr lang="en-US" dirty="0" err="1"/>
-              <a:t>Paulinski</a:t>
-            </a:r>
+          <a:bodyPr>
+            <a:normAutofit fontScale="92500"/>
+          </a:bodyPr>
+          <a:lstStyle/>
+          <a:p>
+            <a:r>
+              <a:rPr lang="en-US" dirty="0"/>
+              <a:t>Class logistics and introduction</a:t>
+            </a:r>
+          </a:p>
+          <a:p>
+            <a:r>
+              <a:rPr lang="en-US" dirty="0"/>
+              <a:t>The Modeling Process</a:t>
+            </a:r>
+          </a:p>
+          <a:p>
+            <a:r>
+              <a:rPr lang="en-US" dirty="0"/>
+              <a:t>Governing equations and numerical methods for groundwater flow</a:t>
+            </a:r>
+          </a:p>
+          <a:p>
+            <a:r>
+              <a:rPr lang="en-US" dirty="0"/>
+              <a:t>Demo: Mechanics of flow and transport modeling</a:t>
+            </a:r>
+          </a:p>
+          <a:p>
+            <a:r>
+              <a:rPr lang="en-US" dirty="0"/>
+              <a:t>Exercise 1: Building a simple 2D model from scratch</a:t>
+            </a:r>
+          </a:p>
+          <a:p>
+            <a:r>
+              <a:rPr lang="en-US" dirty="0"/>
+              <a:t>LUNCH</a:t>
+            </a:r>
+          </a:p>
+          <a:p>
+            <a:r>
+              <a:rPr lang="en-US" dirty="0"/>
+              <a:t>Case study -- Miami-Dade groundwater model</a:t>
+            </a:r>
+          </a:p>
+          <a:p>
+            <a:r>
+              <a:rPr lang="en-US" dirty="0"/>
+              <a:t>Exercise 2: Working with an existing MODFLOW model</a:t>
+            </a:r>
+          </a:p>
+          <a:p>
             <a:endParaRPr lang="en-US" dirty="0"/>
           </a:p>
         </p:txBody>
@@ -3623,7 +3736,7 @@
     </p:spTree>
     <p:extLst>
       <p:ext uri="{BB962C8B-B14F-4D97-AF65-F5344CB8AC3E}">
-        <p14:creationId xmlns:p14="http://schemas.microsoft.com/office/powerpoint/2010/main" val="2825821971"/>
+        <p14:creationId xmlns:p14="http://schemas.microsoft.com/office/powerpoint/2010/main" val="4053355993"/>
       </p:ext>
     </p:extLst>
   </p:cSld>
@@ -3655,7 +3768,7 @@
           <p:cNvPr id="2" name="Title 1">
             <a:extLst>
               <a:ext uri="{FF2B5EF4-FFF2-40B4-BE49-F238E27FC236}">
-                <a16:creationId xmlns:a16="http://schemas.microsoft.com/office/drawing/2014/main" id="{90AF501E-4EA6-9742-9956-D5E6787D122D}"/>
+                <a16:creationId xmlns:a16="http://schemas.microsoft.com/office/drawing/2014/main" id="{A9782016-48E0-9E4C-BD8A-AA38E86CA693}"/>
               </a:ext>
             </a:extLst>
           </p:cNvPr>
@@ -3673,7 +3786,7 @@
           <a:p>
             <a:r>
               <a:rPr lang="en-US" dirty="0"/>
-              <a:t>Agenda</a:t>
+              <a:t>Agenda Day 2</a:t>
             </a:r>
           </a:p>
         </p:txBody>
@@ -3683,7 +3796,7 @@
           <p:cNvPr id="3" name="Content Placeholder 2">
             <a:extLst>
               <a:ext uri="{FF2B5EF4-FFF2-40B4-BE49-F238E27FC236}">
-                <a16:creationId xmlns:a16="http://schemas.microsoft.com/office/drawing/2014/main" id="{4E09AFD4-CFF0-CC4A-B62C-130F234254E1}"/>
+                <a16:creationId xmlns:a16="http://schemas.microsoft.com/office/drawing/2014/main" id="{57169817-92E7-D84A-9360-CFCB04051B86}"/>
               </a:ext>
             </a:extLst>
           </p:cNvPr>
@@ -3696,17 +3809,665 @@
         </p:nvSpPr>
         <p:spPr/>
         <p:txBody>
-          <a:bodyPr/>
-          <a:lstStyle/>
-          <a:p>
-            <a:endParaRPr lang="en-US"/>
+          <a:bodyPr>
+            <a:normAutofit/>
+          </a:bodyPr>
+          <a:lstStyle/>
+          <a:p>
+            <a:r>
+              <a:rPr lang="en-US" dirty="0"/>
+              <a:t>Hydrogeologic frameworks and water budgets</a:t>
+            </a:r>
+          </a:p>
+          <a:p>
+            <a:r>
+              <a:rPr lang="en-US" dirty="0"/>
+              <a:t>Case study: LA Basin groundwater model</a:t>
+            </a:r>
+          </a:p>
+          <a:p>
+            <a:r>
+              <a:rPr lang="en-US" dirty="0"/>
+              <a:t>Introduction to MODFLOW</a:t>
+            </a:r>
+          </a:p>
+          <a:p>
+            <a:r>
+              <a:rPr lang="en-US" dirty="0"/>
+              <a:t>Exercise 3: Building a cross section model</a:t>
+            </a:r>
+          </a:p>
+          <a:p>
+            <a:r>
+              <a:rPr lang="en-US" dirty="0"/>
+              <a:t>LUNCH</a:t>
+            </a:r>
+          </a:p>
+          <a:p>
+            <a:r>
+              <a:rPr lang="en-US" dirty="0"/>
+              <a:t>MODFLOW stress and advanced packages</a:t>
+            </a:r>
+          </a:p>
+          <a:p>
+            <a:r>
+              <a:rPr lang="en-US" dirty="0"/>
+              <a:t>Description of the class project model</a:t>
+            </a:r>
+          </a:p>
+          <a:p>
+            <a:r>
+              <a:rPr lang="en-US" dirty="0"/>
+              <a:t>Exercise 4: Building the class project model</a:t>
+            </a:r>
+          </a:p>
+          <a:p>
+            <a:endParaRPr lang="en-US" dirty="0"/>
           </a:p>
         </p:txBody>
       </p:sp>
     </p:spTree>
     <p:extLst>
       <p:ext uri="{BB962C8B-B14F-4D97-AF65-F5344CB8AC3E}">
-        <p14:creationId xmlns:p14="http://schemas.microsoft.com/office/powerpoint/2010/main" val="4053355993"/>
+        <p14:creationId xmlns:p14="http://schemas.microsoft.com/office/powerpoint/2010/main" val="3851397521"/>
+      </p:ext>
+    </p:extLst>
+  </p:cSld>
+  <p:clrMapOvr>
+    <a:masterClrMapping/>
+  </p:clrMapOvr>
+</p:sld>
+</file>
+
+<file path=ppt/slides/slide5.xml><?xml version="1.0" encoding="utf-8"?>
+<p:sld xmlns:a="http://schemas.openxmlformats.org/drawingml/2006/main" xmlns:r="http://schemas.openxmlformats.org/officeDocument/2006/relationships" xmlns:p="http://schemas.openxmlformats.org/presentationml/2006/main">
+  <p:cSld>
+    <p:spTree>
+      <p:nvGrpSpPr>
+        <p:cNvPr id="1" name=""/>
+        <p:cNvGrpSpPr/>
+        <p:nvPr/>
+      </p:nvGrpSpPr>
+      <p:grpSpPr>
+        <a:xfrm>
+          <a:off x="0" y="0"/>
+          <a:ext cx="0" cy="0"/>
+          <a:chOff x="0" y="0"/>
+          <a:chExt cx="0" cy="0"/>
+        </a:xfrm>
+      </p:grpSpPr>
+      <p:sp>
+        <p:nvSpPr>
+          <p:cNvPr id="2" name="Title 1">
+            <a:extLst>
+              <a:ext uri="{FF2B5EF4-FFF2-40B4-BE49-F238E27FC236}">
+                <a16:creationId xmlns:a16="http://schemas.microsoft.com/office/drawing/2014/main" id="{367A7E43-D028-A54E-9025-BC30DC5D5B23}"/>
+              </a:ext>
+            </a:extLst>
+          </p:cNvPr>
+          <p:cNvSpPr>
+            <a:spLocks noGrp="1"/>
+          </p:cNvSpPr>
+          <p:nvPr>
+            <p:ph type="title"/>
+          </p:nvPr>
+        </p:nvSpPr>
+        <p:spPr/>
+        <p:txBody>
+          <a:bodyPr/>
+          <a:lstStyle/>
+          <a:p>
+            <a:r>
+              <a:rPr lang="en-US" dirty="0"/>
+              <a:t>Agenda Day 3</a:t>
+            </a:r>
+          </a:p>
+        </p:txBody>
+      </p:sp>
+      <p:sp>
+        <p:nvSpPr>
+          <p:cNvPr id="3" name="Content Placeholder 2">
+            <a:extLst>
+              <a:ext uri="{FF2B5EF4-FFF2-40B4-BE49-F238E27FC236}">
+                <a16:creationId xmlns:a16="http://schemas.microsoft.com/office/drawing/2014/main" id="{0793FE32-8D8D-AF47-8AC3-3AB05728FE61}"/>
+              </a:ext>
+            </a:extLst>
+          </p:cNvPr>
+          <p:cNvSpPr>
+            <a:spLocks noGrp="1"/>
+          </p:cNvSpPr>
+          <p:nvPr>
+            <p:ph idx="1"/>
+          </p:nvPr>
+        </p:nvSpPr>
+        <p:spPr/>
+        <p:txBody>
+          <a:bodyPr>
+            <a:normAutofit fontScale="92500" lnSpcReduction="10000"/>
+          </a:bodyPr>
+          <a:lstStyle/>
+          <a:p>
+            <a:r>
+              <a:rPr lang="en-US" dirty="0"/>
+              <a:t>Model calibration</a:t>
+            </a:r>
+          </a:p>
+          <a:p>
+            <a:r>
+              <a:rPr lang="en-US" dirty="0"/>
+              <a:t>Exercise 5: Class project model calibration and prediction</a:t>
+            </a:r>
+          </a:p>
+          <a:p>
+            <a:r>
+              <a:rPr lang="en-US" dirty="0"/>
+              <a:t>LUNCH</a:t>
+            </a:r>
+          </a:p>
+          <a:p>
+            <a:r>
+              <a:rPr lang="en-US" dirty="0"/>
+              <a:t>Exercise 6: Particle flow</a:t>
+            </a:r>
+          </a:p>
+          <a:p>
+            <a:r>
+              <a:rPr lang="en-US" dirty="0"/>
+              <a:t>Solute transport modeling</a:t>
+            </a:r>
+          </a:p>
+          <a:p>
+            <a:r>
+              <a:rPr lang="en-US" dirty="0"/>
+              <a:t>Exercise 7: Class project particle tracking of a contaminant plume</a:t>
+            </a:r>
+          </a:p>
+          <a:p>
+            <a:r>
+              <a:rPr lang="en-US" dirty="0"/>
+              <a:t>Discussion of class project model calibration and predictions</a:t>
+            </a:r>
+          </a:p>
+        </p:txBody>
+      </p:sp>
+    </p:spTree>
+    <p:extLst>
+      <p:ext uri="{BB962C8B-B14F-4D97-AF65-F5344CB8AC3E}">
+        <p14:creationId xmlns:p14="http://schemas.microsoft.com/office/powerpoint/2010/main" val="3028266601"/>
+      </p:ext>
+    </p:extLst>
+  </p:cSld>
+  <p:clrMapOvr>
+    <a:masterClrMapping/>
+  </p:clrMapOvr>
+</p:sld>
+</file>
+
+<file path=ppt/slides/slide6.xml><?xml version="1.0" encoding="utf-8"?>
+<p:sld xmlns:a="http://schemas.openxmlformats.org/drawingml/2006/main" xmlns:r="http://schemas.openxmlformats.org/officeDocument/2006/relationships" xmlns:p="http://schemas.openxmlformats.org/presentationml/2006/main">
+  <p:cSld>
+    <p:spTree>
+      <p:nvGrpSpPr>
+        <p:cNvPr id="1" name=""/>
+        <p:cNvGrpSpPr/>
+        <p:nvPr/>
+      </p:nvGrpSpPr>
+      <p:grpSpPr>
+        <a:xfrm>
+          <a:off x="0" y="0"/>
+          <a:ext cx="0" cy="0"/>
+          <a:chOff x="0" y="0"/>
+          <a:chExt cx="0" cy="0"/>
+        </a:xfrm>
+      </p:grpSpPr>
+      <p:sp>
+        <p:nvSpPr>
+          <p:cNvPr id="2" name="Title 1">
+            <a:extLst>
+              <a:ext uri="{FF2B5EF4-FFF2-40B4-BE49-F238E27FC236}">
+                <a16:creationId xmlns:a16="http://schemas.microsoft.com/office/drawing/2014/main" id="{C9398B59-F1C0-9449-A058-67EAF2413322}"/>
+              </a:ext>
+            </a:extLst>
+          </p:cNvPr>
+          <p:cNvSpPr>
+            <a:spLocks noGrp="1"/>
+          </p:cNvSpPr>
+          <p:nvPr>
+            <p:ph type="title"/>
+          </p:nvPr>
+        </p:nvSpPr>
+        <p:spPr/>
+        <p:txBody>
+          <a:bodyPr/>
+          <a:lstStyle/>
+          <a:p>
+            <a:r>
+              <a:rPr lang="en-US" dirty="0"/>
+              <a:t>Agenda Day 4</a:t>
+            </a:r>
+          </a:p>
+        </p:txBody>
+      </p:sp>
+      <p:sp>
+        <p:nvSpPr>
+          <p:cNvPr id="3" name="Content Placeholder 2">
+            <a:extLst>
+              <a:ext uri="{FF2B5EF4-FFF2-40B4-BE49-F238E27FC236}">
+                <a16:creationId xmlns:a16="http://schemas.microsoft.com/office/drawing/2014/main" id="{F8841FB3-B00E-2148-BC10-3FD37960424B}"/>
+              </a:ext>
+            </a:extLst>
+          </p:cNvPr>
+          <p:cNvSpPr>
+            <a:spLocks noGrp="1"/>
+          </p:cNvSpPr>
+          <p:nvPr>
+            <p:ph idx="1"/>
+          </p:nvPr>
+        </p:nvSpPr>
+        <p:spPr/>
+        <p:txBody>
+          <a:bodyPr>
+            <a:normAutofit fontScale="92500" lnSpcReduction="10000"/>
+          </a:bodyPr>
+          <a:lstStyle/>
+          <a:p>
+            <a:r>
+              <a:rPr lang="en-US" dirty="0"/>
+              <a:t>Solute transport governing equations</a:t>
+            </a:r>
+          </a:p>
+          <a:p>
+            <a:r>
+              <a:rPr lang="en-US" dirty="0"/>
+              <a:t>Exercise 8: Simulating advective and dispersive movement of a contaminant plume</a:t>
+            </a:r>
+          </a:p>
+          <a:p>
+            <a:r>
+              <a:rPr lang="en-US" dirty="0"/>
+              <a:t>Exercise 9: Simulation of remediation alternatives</a:t>
+            </a:r>
+          </a:p>
+          <a:p>
+            <a:r>
+              <a:rPr lang="en-US" dirty="0"/>
+              <a:t>LUNCH</a:t>
+            </a:r>
+          </a:p>
+          <a:p>
+            <a:r>
+              <a:rPr lang="en-US" dirty="0"/>
+              <a:t>Class project: Students break into teams to design a model for a class project</a:t>
+            </a:r>
+          </a:p>
+          <a:p>
+            <a:r>
+              <a:rPr lang="en-US" dirty="0"/>
+              <a:t>Special topics</a:t>
+            </a:r>
+          </a:p>
+          <a:p>
+            <a:r>
+              <a:rPr lang="en-US" dirty="0"/>
+              <a:t>Wrap up and/or time for working with participant models</a:t>
+            </a:r>
+          </a:p>
+        </p:txBody>
+      </p:sp>
+    </p:spTree>
+    <p:extLst>
+      <p:ext uri="{BB962C8B-B14F-4D97-AF65-F5344CB8AC3E}">
+        <p14:creationId xmlns:p14="http://schemas.microsoft.com/office/powerpoint/2010/main" val="3844614200"/>
+      </p:ext>
+    </p:extLst>
+  </p:cSld>
+  <p:clrMapOvr>
+    <a:masterClrMapping/>
+  </p:clrMapOvr>
+</p:sld>
+</file>
+
+<file path=ppt/slides/slide7.xml><?xml version="1.0" encoding="utf-8"?>
+<p:sld xmlns:a="http://schemas.openxmlformats.org/drawingml/2006/main" xmlns:r="http://schemas.openxmlformats.org/officeDocument/2006/relationships" xmlns:p="http://schemas.openxmlformats.org/presentationml/2006/main">
+  <p:cSld>
+    <p:spTree>
+      <p:nvGrpSpPr>
+        <p:cNvPr id="1" name=""/>
+        <p:cNvGrpSpPr/>
+        <p:nvPr/>
+      </p:nvGrpSpPr>
+      <p:grpSpPr>
+        <a:xfrm>
+          <a:off x="0" y="0"/>
+          <a:ext cx="0" cy="0"/>
+          <a:chOff x="0" y="0"/>
+          <a:chExt cx="0" cy="0"/>
+        </a:xfrm>
+      </p:grpSpPr>
+      <p:sp>
+        <p:nvSpPr>
+          <p:cNvPr id="2" name="Title 1">
+            <a:extLst>
+              <a:ext uri="{FF2B5EF4-FFF2-40B4-BE49-F238E27FC236}">
+                <a16:creationId xmlns:a16="http://schemas.microsoft.com/office/drawing/2014/main" id="{F68CAD2D-76FF-324D-8A64-71172A0F4A59}"/>
+              </a:ext>
+            </a:extLst>
+          </p:cNvPr>
+          <p:cNvSpPr>
+            <a:spLocks noGrp="1"/>
+          </p:cNvSpPr>
+          <p:nvPr>
+            <p:ph type="title"/>
+          </p:nvPr>
+        </p:nvSpPr>
+        <p:spPr/>
+        <p:txBody>
+          <a:bodyPr/>
+          <a:lstStyle/>
+          <a:p>
+            <a:r>
+              <a:rPr lang="en-US" dirty="0"/>
+              <a:t>Software</a:t>
+            </a:r>
+          </a:p>
+        </p:txBody>
+      </p:sp>
+      <p:sp>
+        <p:nvSpPr>
+          <p:cNvPr id="3" name="Content Placeholder 2">
+            <a:extLst>
+              <a:ext uri="{FF2B5EF4-FFF2-40B4-BE49-F238E27FC236}">
+                <a16:creationId xmlns:a16="http://schemas.microsoft.com/office/drawing/2014/main" id="{743FF15F-E73A-8A40-AEF2-14B47EF06C07}"/>
+              </a:ext>
+            </a:extLst>
+          </p:cNvPr>
+          <p:cNvSpPr>
+            <a:spLocks noGrp="1"/>
+          </p:cNvSpPr>
+          <p:nvPr>
+            <p:ph idx="1"/>
+          </p:nvPr>
+        </p:nvSpPr>
+        <p:spPr/>
+        <p:txBody>
+          <a:bodyPr>
+            <a:normAutofit lnSpcReduction="10000"/>
+          </a:bodyPr>
+          <a:lstStyle/>
+          <a:p>
+            <a:r>
+              <a:rPr lang="en-US" dirty="0"/>
+              <a:t>MODFLOW</a:t>
+            </a:r>
+          </a:p>
+          <a:p>
+            <a:r>
+              <a:rPr lang="en-US" dirty="0"/>
+              <a:t>MODPATH</a:t>
+            </a:r>
+          </a:p>
+          <a:p>
+            <a:r>
+              <a:rPr lang="en-US" dirty="0"/>
+              <a:t>MT3DMS</a:t>
+            </a:r>
+          </a:p>
+          <a:p>
+            <a:r>
+              <a:rPr lang="en-US" dirty="0"/>
+              <a:t>Groundwater Vistas</a:t>
+            </a:r>
+          </a:p>
+          <a:p>
+            <a:r>
+              <a:rPr lang="en-US" dirty="0" err="1"/>
+              <a:t>ModelViewer</a:t>
+            </a:r>
+            <a:endParaRPr lang="en-US" dirty="0"/>
+          </a:p>
+          <a:p>
+            <a:r>
+              <a:rPr lang="en-US" dirty="0" err="1"/>
+              <a:t>Zonebudget</a:t>
+            </a:r>
+            <a:endParaRPr lang="en-US" dirty="0"/>
+          </a:p>
+          <a:p>
+            <a:r>
+              <a:rPr lang="en-US" dirty="0"/>
+              <a:t>Git</a:t>
+            </a:r>
+          </a:p>
+          <a:p>
+            <a:r>
+              <a:rPr lang="en-US" dirty="0"/>
+              <a:t>Notepad++</a:t>
+            </a:r>
+          </a:p>
+          <a:p>
+            <a:r>
+              <a:rPr lang="en-US" dirty="0"/>
+              <a:t>Python and </a:t>
+            </a:r>
+            <a:r>
+              <a:rPr lang="en-US" dirty="0" err="1"/>
+              <a:t>Flopy</a:t>
+            </a:r>
+            <a:endParaRPr lang="en-US" dirty="0"/>
+          </a:p>
+        </p:txBody>
+      </p:sp>
+    </p:spTree>
+    <p:extLst>
+      <p:ext uri="{BB962C8B-B14F-4D97-AF65-F5344CB8AC3E}">
+        <p14:creationId xmlns:p14="http://schemas.microsoft.com/office/powerpoint/2010/main" val="3590094326"/>
+      </p:ext>
+    </p:extLst>
+  </p:cSld>
+  <p:clrMapOvr>
+    <a:masterClrMapping/>
+  </p:clrMapOvr>
+</p:sld>
+</file>
+
+<file path=ppt/slides/slide8.xml><?xml version="1.0" encoding="utf-8"?>
+<p:sld xmlns:a="http://schemas.openxmlformats.org/drawingml/2006/main" xmlns:r="http://schemas.openxmlformats.org/officeDocument/2006/relationships" xmlns:p="http://schemas.openxmlformats.org/presentationml/2006/main">
+  <p:cSld>
+    <p:spTree>
+      <p:nvGrpSpPr>
+        <p:cNvPr id="1" name=""/>
+        <p:cNvGrpSpPr/>
+        <p:nvPr/>
+      </p:nvGrpSpPr>
+      <p:grpSpPr>
+        <a:xfrm>
+          <a:off x="0" y="0"/>
+          <a:ext cx="0" cy="0"/>
+          <a:chOff x="0" y="0"/>
+          <a:chExt cx="0" cy="0"/>
+        </a:xfrm>
+      </p:grpSpPr>
+      <p:sp>
+        <p:nvSpPr>
+          <p:cNvPr id="2" name="Title 1">
+            <a:extLst>
+              <a:ext uri="{FF2B5EF4-FFF2-40B4-BE49-F238E27FC236}">
+                <a16:creationId xmlns:a16="http://schemas.microsoft.com/office/drawing/2014/main" id="{60FB92C8-9BC1-B247-B05C-45D2B1EED204}"/>
+              </a:ext>
+            </a:extLst>
+          </p:cNvPr>
+          <p:cNvSpPr>
+            <a:spLocks noGrp="1"/>
+          </p:cNvSpPr>
+          <p:nvPr>
+            <p:ph type="title"/>
+          </p:nvPr>
+        </p:nvSpPr>
+        <p:spPr/>
+        <p:txBody>
+          <a:bodyPr/>
+          <a:lstStyle/>
+          <a:p>
+            <a:r>
+              <a:rPr lang="en-US" dirty="0"/>
+              <a:t>Special Topics</a:t>
+            </a:r>
+          </a:p>
+        </p:txBody>
+      </p:sp>
+      <p:sp>
+        <p:nvSpPr>
+          <p:cNvPr id="3" name="Content Placeholder 2">
+            <a:extLst>
+              <a:ext uri="{FF2B5EF4-FFF2-40B4-BE49-F238E27FC236}">
+                <a16:creationId xmlns:a16="http://schemas.microsoft.com/office/drawing/2014/main" id="{57B22817-6837-7F45-B239-1DB75FA17832}"/>
+              </a:ext>
+            </a:extLst>
+          </p:cNvPr>
+          <p:cNvSpPr>
+            <a:spLocks noGrp="1"/>
+          </p:cNvSpPr>
+          <p:nvPr>
+            <p:ph idx="1"/>
+          </p:nvPr>
+        </p:nvSpPr>
+        <p:spPr/>
+        <p:txBody>
+          <a:bodyPr>
+            <a:normAutofit fontScale="92500" lnSpcReduction="20000"/>
+          </a:bodyPr>
+          <a:lstStyle/>
+          <a:p>
+            <a:r>
+              <a:rPr lang="en-US" sz="1800" dirty="0"/>
+              <a:t>Advanced model calibration</a:t>
+            </a:r>
+          </a:p>
+          <a:p>
+            <a:pPr lvl="1"/>
+            <a:r>
+              <a:rPr lang="en-US" sz="1400" dirty="0"/>
+              <a:t>PEST</a:t>
+            </a:r>
+          </a:p>
+          <a:p>
+            <a:r>
+              <a:rPr lang="en-US" sz="1800" dirty="0"/>
+              <a:t>Unstructured grids</a:t>
+            </a:r>
+          </a:p>
+          <a:p>
+            <a:pPr lvl="1"/>
+            <a:r>
+              <a:rPr lang="en-US" sz="1400" dirty="0"/>
+              <a:t>Local grid refinement</a:t>
+            </a:r>
+          </a:p>
+          <a:p>
+            <a:pPr lvl="1"/>
+            <a:r>
+              <a:rPr lang="en-US" sz="1400" dirty="0"/>
+              <a:t>Alternative mesh types</a:t>
+            </a:r>
+          </a:p>
+          <a:p>
+            <a:r>
+              <a:rPr lang="en-US" sz="1800" dirty="0"/>
+              <a:t>Advanced MODFLOW Packages</a:t>
+            </a:r>
+          </a:p>
+          <a:p>
+            <a:pPr lvl="1"/>
+            <a:r>
+              <a:rPr lang="en-US" sz="1400" dirty="0"/>
+              <a:t>Streamflow routing</a:t>
+            </a:r>
+          </a:p>
+          <a:p>
+            <a:pPr lvl="1"/>
+            <a:r>
+              <a:rPr lang="en-US" sz="1400" dirty="0"/>
+              <a:t>Lake</a:t>
+            </a:r>
+          </a:p>
+          <a:p>
+            <a:pPr lvl="1"/>
+            <a:r>
+              <a:rPr lang="en-US" sz="1400" dirty="0"/>
+              <a:t>Unsaturated zone</a:t>
+            </a:r>
+          </a:p>
+          <a:p>
+            <a:pPr lvl="1"/>
+            <a:r>
+              <a:rPr lang="en-US" sz="1400" dirty="0"/>
+              <a:t>Multi-aquifer wells</a:t>
+            </a:r>
+          </a:p>
+          <a:p>
+            <a:r>
+              <a:rPr lang="en-US" sz="1800" dirty="0"/>
+              <a:t>Variable density modeling</a:t>
+            </a:r>
+          </a:p>
+          <a:p>
+            <a:pPr lvl="1"/>
+            <a:r>
+              <a:rPr lang="en-US" sz="1400" dirty="0"/>
+              <a:t>Seawater intrusion</a:t>
+            </a:r>
+          </a:p>
+          <a:p>
+            <a:pPr lvl="1"/>
+            <a:r>
+              <a:rPr lang="en-US" sz="1400" dirty="0"/>
+              <a:t>Heat transport</a:t>
+            </a:r>
+          </a:p>
+          <a:p>
+            <a:r>
+              <a:rPr lang="en-US" sz="1800" dirty="0"/>
+              <a:t>Python</a:t>
+            </a:r>
+          </a:p>
+          <a:p>
+            <a:pPr lvl="1"/>
+            <a:r>
+              <a:rPr lang="en-US" sz="1400" dirty="0" err="1"/>
+              <a:t>Jupyter</a:t>
+            </a:r>
+            <a:r>
+              <a:rPr lang="en-US" sz="1400" dirty="0"/>
+              <a:t> notebooks</a:t>
+            </a:r>
+          </a:p>
+          <a:p>
+            <a:pPr lvl="1"/>
+            <a:r>
+              <a:rPr lang="en-US" sz="1400" dirty="0" err="1"/>
+              <a:t>Flopy</a:t>
+            </a:r>
+            <a:endParaRPr lang="en-US" sz="1400" dirty="0"/>
+          </a:p>
+          <a:p>
+            <a:r>
+              <a:rPr lang="en-US" sz="1800" dirty="0"/>
+              <a:t>Version control</a:t>
+            </a:r>
+          </a:p>
+          <a:p>
+            <a:pPr lvl="1"/>
+            <a:r>
+              <a:rPr lang="en-US" sz="1400" dirty="0"/>
+              <a:t>Git</a:t>
+            </a:r>
+          </a:p>
+        </p:txBody>
+      </p:sp>
+    </p:spTree>
+    <p:extLst>
+      <p:ext uri="{BB962C8B-B14F-4D97-AF65-F5344CB8AC3E}">
+        <p14:creationId xmlns:p14="http://schemas.microsoft.com/office/powerpoint/2010/main" val="2976571096"/>
       </p:ext>
     </p:extLst>
   </p:cSld>

</xml_diff>